<commit_message>
Fixed bug in Update budget and account for currency change
</commit_message>
<xml_diff>
--- a/Design/presentation.pptx
+++ b/Design/presentation.pptx
@@ -5,17 +5,19 @@
     <p:sldMasterId id="2147483648" r:id="rId4"/>
   </p:sldMasterIdLst>
   <p:notesMasterIdLst>
-    <p:notesMasterId r:id="rId10"/>
+    <p:notesMasterId r:id="rId12"/>
   </p:notesMasterIdLst>
   <p:handoutMasterIdLst>
-    <p:handoutMasterId r:id="rId11"/>
+    <p:handoutMasterId r:id="rId13"/>
   </p:handoutMasterIdLst>
   <p:sldIdLst>
     <p:sldId id="327" r:id="rId5"/>
-    <p:sldId id="325" r:id="rId6"/>
+    <p:sldId id="331" r:id="rId6"/>
     <p:sldId id="328" r:id="rId7"/>
-    <p:sldId id="329" r:id="rId8"/>
-    <p:sldId id="330" r:id="rId9"/>
+    <p:sldId id="330" r:id="rId8"/>
+    <p:sldId id="329" r:id="rId9"/>
+    <p:sldId id="325" r:id="rId10"/>
+    <p:sldId id="332" r:id="rId11"/>
   </p:sldIdLst>
   <p:sldSz cx="12192000" cy="6858000"/>
   <p:notesSz cx="6858000" cy="9144000"/>
@@ -239,7 +241,7 @@
           <a:p>
             <a:fld id="{7FF95820-84BB-3447-8286-60A51307E7F2}" type="datetimeFigureOut">
               <a:rPr lang="en-US" smtClean="0"/>
-              <a:t>10/31/2022</a:t>
+              <a:t>11/2/2022</a:t>
             </a:fld>
             <a:endParaRPr lang="en-US" dirty="0"/>
           </a:p>
@@ -417,7 +419,7 @@
           <a:p>
             <a:fld id="{FC08FC54-6AE4-6A4A-9756-823A0F1BE5A6}" type="datetimeFigureOut">
               <a:rPr lang="en-US" smtClean="0"/>
-              <a:t>10/31/2022</a:t>
+              <a:t>11/2/2022</a:t>
             </a:fld>
             <a:endParaRPr lang="en-US" dirty="0"/>
           </a:p>
@@ -11401,7 +11403,7 @@
         <p:spPr>
           <a:xfrm>
             <a:off x="3482109" y="554456"/>
-            <a:ext cx="5227781" cy="830997"/>
+            <a:ext cx="5227781" cy="923330"/>
           </a:xfrm>
           <a:prstGeom prst="rect">
             <a:avLst/>
@@ -11416,10 +11418,10 @@
           <a:p>
             <a:pPr algn="ctr"/>
             <a:r>
-              <a:rPr lang="en-US" sz="4800" dirty="0"/>
+              <a:rPr lang="en-US" sz="5400" dirty="0"/>
               <a:t>Who are we?</a:t>
             </a:r>
-            <a:endParaRPr lang="en-GB" sz="4800" dirty="0"/>
+            <a:endParaRPr lang="en-GB" sz="5400" dirty="0"/>
           </a:p>
         </p:txBody>
       </p:sp>
@@ -11438,7 +11440,7 @@
         <p:spPr>
           <a:xfrm>
             <a:off x="3897744" y="5934212"/>
-            <a:ext cx="4396509" cy="369332"/>
+            <a:ext cx="4396509" cy="400110"/>
           </a:xfrm>
           <a:prstGeom prst="rect">
             <a:avLst/>
@@ -11453,10 +11455,10 @@
           <a:p>
             <a:pPr algn="ctr"/>
             <a:r>
-              <a:rPr lang="en-US" dirty="0"/>
+              <a:rPr lang="en-US" sz="2000" dirty="0"/>
               <a:t>Cadets in IT Talents Season 14</a:t>
             </a:r>
-            <a:endParaRPr lang="en-GB" dirty="0"/>
+            <a:endParaRPr lang="en-GB" sz="2000" dirty="0"/>
           </a:p>
         </p:txBody>
       </p:sp>
@@ -11474,8 +11476,8 @@
         </p:nvSpPr>
         <p:spPr>
           <a:xfrm>
-            <a:off x="1348510" y="1450109"/>
-            <a:ext cx="3223491" cy="369332"/>
+            <a:off x="7684654" y="1588655"/>
+            <a:ext cx="3223491" cy="523220"/>
           </a:xfrm>
           <a:prstGeom prst="rect">
             <a:avLst/>
@@ -11490,10 +11492,10 @@
           <a:p>
             <a:pPr algn="ctr"/>
             <a:r>
-              <a:rPr lang="en-US" dirty="0"/>
+              <a:rPr lang="en-US" sz="2800" dirty="0"/>
               <a:t>Vasil Vazonov </a:t>
             </a:r>
-            <a:endParaRPr lang="en-GB" dirty="0"/>
+            <a:endParaRPr lang="en-GB" sz="2800" dirty="0"/>
           </a:p>
         </p:txBody>
       </p:sp>
@@ -11511,8 +11513,8 @@
         </p:nvSpPr>
         <p:spPr>
           <a:xfrm>
-            <a:off x="7620000" y="1450109"/>
-            <a:ext cx="2770909" cy="369332"/>
+            <a:off x="1126835" y="1588655"/>
+            <a:ext cx="2770909" cy="523220"/>
           </a:xfrm>
           <a:prstGeom prst="rect">
             <a:avLst/>
@@ -11527,14 +11529,14 @@
           <a:p>
             <a:pPr algn="ctr"/>
             <a:r>
-              <a:rPr lang="en-US" dirty="0"/>
+              <a:rPr lang="en-US" sz="2800" dirty="0"/>
               <a:t>Martin </a:t>
             </a:r>
             <a:r>
-              <a:rPr lang="en-US" dirty="0" err="1"/>
+              <a:rPr lang="en-US" sz="2800" dirty="0" err="1"/>
               <a:t>Kuyumdjiev</a:t>
             </a:r>
-            <a:endParaRPr lang="en-GB" dirty="0"/>
+            <a:endParaRPr lang="en-GB" sz="2800" dirty="0"/>
           </a:p>
         </p:txBody>
       </p:sp>
@@ -11568,12 +11570,42 @@
           <a:chExt cx="0" cy="0"/>
         </a:xfrm>
       </p:grpSpPr>
-      <p:sp>
-        <p:nvSpPr>
-          <p:cNvPr id="11" name="TextBox 10">
-            <a:extLst>
-              <a:ext uri="{FF2B5EF4-FFF2-40B4-BE49-F238E27FC236}">
-                <a16:creationId xmlns:a16="http://schemas.microsoft.com/office/drawing/2014/main" id="{1A16B87E-7AA5-32CF-AD71-4274ACD1FDD5}"/>
+      <p:pic>
+        <p:nvPicPr>
+          <p:cNvPr id="6" name="Picture Placeholder 5" descr="Graphical user interface, application&#10;&#10;Description automatically generated">
+            <a:extLst>
+              <a:ext uri="{FF2B5EF4-FFF2-40B4-BE49-F238E27FC236}">
+                <a16:creationId xmlns:a16="http://schemas.microsoft.com/office/drawing/2014/main" id="{AC2D341B-7B9B-5DD5-8F62-1AFCF7EE25D9}"/>
+              </a:ext>
+            </a:extLst>
+          </p:cNvPr>
+          <p:cNvPicPr>
+            <a:picLocks noGrp="1" noChangeAspect="1"/>
+          </p:cNvPicPr>
+          <p:nvPr>
+            <p:ph idx="1"/>
+          </p:nvPr>
+        </p:nvPicPr>
+        <p:blipFill>
+          <a:blip r:embed="rId2"/>
+          <a:stretch>
+            <a:fillRect/>
+          </a:stretch>
+        </p:blipFill>
+        <p:spPr>
+          <a:xfrm>
+            <a:off x="4129981" y="1503054"/>
+            <a:ext cx="3932037" cy="5461164"/>
+          </a:xfrm>
+          <a:noFill/>
+        </p:spPr>
+      </p:pic>
+      <p:sp>
+        <p:nvSpPr>
+          <p:cNvPr id="7" name="TextBox 6">
+            <a:extLst>
+              <a:ext uri="{FF2B5EF4-FFF2-40B4-BE49-F238E27FC236}">
+                <a16:creationId xmlns:a16="http://schemas.microsoft.com/office/drawing/2014/main" id="{B278E241-F9E3-E079-C99A-F32A98E30F41}"/>
               </a:ext>
             </a:extLst>
           </p:cNvPr>
@@ -11582,8 +11614,8 @@
         </p:nvSpPr>
         <p:spPr>
           <a:xfrm>
-            <a:off x="3500582" y="249383"/>
-            <a:ext cx="5190836" cy="584775"/>
+            <a:off x="1935595" y="487391"/>
+            <a:ext cx="8320809" cy="1015663"/>
           </a:xfrm>
           <a:prstGeom prst="rect">
             <a:avLst/>
@@ -11598,676 +11630,17 @@
           <a:p>
             <a:pPr algn="ctr"/>
             <a:r>
-              <a:rPr lang="en-US" sz="3200" dirty="0"/>
-              <a:t>Finance Tracker App</a:t>
-            </a:r>
-            <a:endParaRPr lang="en-GB" sz="3200" dirty="0"/>
-          </a:p>
-        </p:txBody>
-      </p:sp>
-      <p:sp>
-        <p:nvSpPr>
-          <p:cNvPr id="12" name="TextBox 11">
-            <a:extLst>
-              <a:ext uri="{FF2B5EF4-FFF2-40B4-BE49-F238E27FC236}">
-                <a16:creationId xmlns:a16="http://schemas.microsoft.com/office/drawing/2014/main" id="{1EB7F556-9762-587D-5107-E44777AEC12D}"/>
-              </a:ext>
-            </a:extLst>
-          </p:cNvPr>
-          <p:cNvSpPr txBox="1"/>
-          <p:nvPr/>
-        </p:nvSpPr>
-        <p:spPr>
-          <a:xfrm>
-            <a:off x="776193" y="1123570"/>
-            <a:ext cx="2530764" cy="2400657"/>
-          </a:xfrm>
-          <a:prstGeom prst="rect">
-            <a:avLst/>
-          </a:prstGeom>
-          <a:noFill/>
-        </p:spPr>
-        <p:txBody>
-          <a:bodyPr wrap="square" rtlCol="0">
-            <a:spAutoFit/>
-          </a:bodyPr>
-          <a:lstStyle/>
-          <a:p>
-            <a:r>
-              <a:rPr lang="en-US" sz="2000" dirty="0"/>
-              <a:t>Users</a:t>
-            </a:r>
-          </a:p>
-          <a:p>
-            <a:pPr marL="342900" indent="-342900">
-              <a:buFont typeface="Arial" panose="020B0604020202020204" pitchFamily="34" charset="0"/>
-              <a:buChar char="•"/>
-            </a:pPr>
-            <a:r>
-              <a:rPr lang="en-US" dirty="0"/>
-              <a:t>Register</a:t>
-            </a:r>
-          </a:p>
-          <a:p>
-            <a:pPr marL="342900" indent="-342900">
-              <a:buFont typeface="Arial" panose="020B0604020202020204" pitchFamily="34" charset="0"/>
-              <a:buChar char="•"/>
-            </a:pPr>
-            <a:r>
-              <a:rPr lang="en-US" dirty="0"/>
-              <a:t>Login – Logout</a:t>
-            </a:r>
-          </a:p>
-          <a:p>
-            <a:pPr marL="342900" indent="-342900">
-              <a:buFont typeface="Arial" panose="020B0604020202020204" pitchFamily="34" charset="0"/>
-              <a:buChar char="•"/>
-            </a:pPr>
-            <a:r>
-              <a:rPr lang="en-US" dirty="0"/>
-              <a:t>Forgotten Password</a:t>
-            </a:r>
-          </a:p>
-          <a:p>
-            <a:pPr marL="342900" indent="-342900">
-              <a:buFont typeface="Arial" panose="020B0604020202020204" pitchFamily="34" charset="0"/>
-              <a:buChar char="•"/>
-            </a:pPr>
-            <a:r>
-              <a:rPr lang="en-US" dirty="0"/>
-              <a:t>Update profile</a:t>
-            </a:r>
-          </a:p>
-          <a:p>
-            <a:pPr marL="342900" indent="-342900">
-              <a:buFont typeface="Arial" panose="020B0604020202020204" pitchFamily="34" charset="0"/>
-              <a:buChar char="•"/>
-            </a:pPr>
-            <a:endParaRPr lang="en-US" dirty="0"/>
-          </a:p>
-          <a:p>
-            <a:pPr marL="342900" indent="-342900">
-              <a:buFont typeface="Arial" panose="020B0604020202020204" pitchFamily="34" charset="0"/>
-              <a:buChar char="•"/>
-            </a:pPr>
-            <a:endParaRPr lang="en-US" dirty="0"/>
-          </a:p>
-          <a:p>
-            <a:pPr marL="285750" indent="-285750">
-              <a:buFont typeface="Arial" panose="020B0604020202020204" pitchFamily="34" charset="0"/>
-              <a:buChar char="•"/>
-            </a:pPr>
-            <a:endParaRPr lang="en-GB" dirty="0"/>
-          </a:p>
-        </p:txBody>
-      </p:sp>
-      <p:sp>
-        <p:nvSpPr>
-          <p:cNvPr id="13" name="TextBox 12">
-            <a:extLst>
-              <a:ext uri="{FF2B5EF4-FFF2-40B4-BE49-F238E27FC236}">
-                <a16:creationId xmlns:a16="http://schemas.microsoft.com/office/drawing/2014/main" id="{89CBBF1E-B26F-C006-4E89-AA8166DEC5CF}"/>
-              </a:ext>
-            </a:extLst>
-          </p:cNvPr>
-          <p:cNvSpPr txBox="1"/>
-          <p:nvPr/>
-        </p:nvSpPr>
-        <p:spPr>
-          <a:xfrm>
-            <a:off x="3087030" y="1123570"/>
-            <a:ext cx="2530764" cy="2062103"/>
-          </a:xfrm>
-          <a:prstGeom prst="rect">
-            <a:avLst/>
-          </a:prstGeom>
-          <a:noFill/>
-        </p:spPr>
-        <p:txBody>
-          <a:bodyPr wrap="square" rtlCol="0">
-            <a:spAutoFit/>
-          </a:bodyPr>
-          <a:lstStyle/>
-          <a:p>
-            <a:r>
-              <a:rPr lang="en-US" sz="2000" dirty="0"/>
-              <a:t>Accounts</a:t>
-            </a:r>
-          </a:p>
-          <a:p>
-            <a:pPr marL="342900" indent="-342900">
-              <a:buFont typeface="Arial" panose="020B0604020202020204" pitchFamily="34" charset="0"/>
-              <a:buChar char="•"/>
-            </a:pPr>
-            <a:r>
-              <a:rPr lang="en-US" dirty="0"/>
-              <a:t>Create/Update/Delete</a:t>
-            </a:r>
-          </a:p>
-          <a:p>
-            <a:pPr marL="342900" indent="-342900">
-              <a:buFont typeface="Arial" panose="020B0604020202020204" pitchFamily="34" charset="0"/>
-              <a:buChar char="•"/>
-            </a:pPr>
-            <a:r>
-              <a:rPr lang="en-US" dirty="0"/>
-              <a:t>Get all own acc</a:t>
-            </a:r>
-          </a:p>
-          <a:p>
-            <a:pPr marL="342900" indent="-342900">
-              <a:buFont typeface="Arial" panose="020B0604020202020204" pitchFamily="34" charset="0"/>
-              <a:buChar char="•"/>
-            </a:pPr>
-            <a:r>
-              <a:rPr lang="en-US" dirty="0"/>
-              <a:t>Add money</a:t>
-            </a:r>
-          </a:p>
-          <a:p>
-            <a:pPr marL="342900" indent="-342900">
-              <a:buFont typeface="Arial" panose="020B0604020202020204" pitchFamily="34" charset="0"/>
-              <a:buChar char="•"/>
-            </a:pPr>
-            <a:endParaRPr lang="en-US" dirty="0"/>
-          </a:p>
-          <a:p>
-            <a:pPr marL="342900" indent="-342900">
-              <a:buFont typeface="Arial" panose="020B0604020202020204" pitchFamily="34" charset="0"/>
-              <a:buChar char="•"/>
-            </a:pPr>
-            <a:endParaRPr lang="en-US" dirty="0"/>
-          </a:p>
-          <a:p>
-            <a:pPr marL="285750" indent="-285750">
-              <a:buFont typeface="Arial" panose="020B0604020202020204" pitchFamily="34" charset="0"/>
-              <a:buChar char="•"/>
-            </a:pPr>
-            <a:endParaRPr lang="en-GB" dirty="0"/>
-          </a:p>
-        </p:txBody>
-      </p:sp>
-      <p:sp>
-        <p:nvSpPr>
-          <p:cNvPr id="14" name="TextBox 13">
-            <a:extLst>
-              <a:ext uri="{FF2B5EF4-FFF2-40B4-BE49-F238E27FC236}">
-                <a16:creationId xmlns:a16="http://schemas.microsoft.com/office/drawing/2014/main" id="{45834FD2-8D3C-2398-901D-41ED5EBE2A80}"/>
-              </a:ext>
-            </a:extLst>
-          </p:cNvPr>
-          <p:cNvSpPr txBox="1"/>
-          <p:nvPr/>
-        </p:nvSpPr>
-        <p:spPr>
-          <a:xfrm>
-            <a:off x="5617794" y="1028343"/>
-            <a:ext cx="2530764" cy="1785104"/>
-          </a:xfrm>
-          <a:prstGeom prst="rect">
-            <a:avLst/>
-          </a:prstGeom>
-          <a:noFill/>
-        </p:spPr>
-        <p:txBody>
-          <a:bodyPr wrap="square" rtlCol="0">
-            <a:spAutoFit/>
-          </a:bodyPr>
-          <a:lstStyle/>
-          <a:p>
-            <a:r>
-              <a:rPr lang="en-US" sz="2000" dirty="0"/>
-              <a:t>Budgets</a:t>
-            </a:r>
-          </a:p>
-          <a:p>
-            <a:pPr marL="342900" indent="-342900">
-              <a:buFont typeface="Arial" panose="020B0604020202020204" pitchFamily="34" charset="0"/>
-              <a:buChar char="•"/>
-            </a:pPr>
-            <a:r>
-              <a:rPr lang="en-US" dirty="0"/>
-              <a:t>Create/Update/Delete</a:t>
-            </a:r>
-          </a:p>
-          <a:p>
-            <a:pPr marL="342900" indent="-342900">
-              <a:buFont typeface="Arial" panose="020B0604020202020204" pitchFamily="34" charset="0"/>
-              <a:buChar char="•"/>
-            </a:pPr>
-            <a:r>
-              <a:rPr lang="en-US" dirty="0"/>
-              <a:t>Get by Id</a:t>
-            </a:r>
-          </a:p>
-          <a:p>
-            <a:pPr marL="342900" indent="-342900">
-              <a:buFont typeface="Arial" panose="020B0604020202020204" pitchFamily="34" charset="0"/>
-              <a:buChar char="•"/>
-            </a:pPr>
-            <a:r>
-              <a:rPr lang="en-US" dirty="0"/>
-              <a:t>Get all for user</a:t>
-            </a:r>
-          </a:p>
-          <a:p>
-            <a:pPr marL="342900" indent="-342900">
-              <a:buFont typeface="Arial" panose="020B0604020202020204" pitchFamily="34" charset="0"/>
-              <a:buChar char="•"/>
-            </a:pPr>
-            <a:endParaRPr lang="en-US" dirty="0"/>
-          </a:p>
-          <a:p>
-            <a:pPr marL="285750" indent="-285750">
-              <a:buFont typeface="Arial" panose="020B0604020202020204" pitchFamily="34" charset="0"/>
-              <a:buChar char="•"/>
-            </a:pPr>
-            <a:endParaRPr lang="en-GB" dirty="0"/>
-          </a:p>
-        </p:txBody>
-      </p:sp>
-      <p:sp>
-        <p:nvSpPr>
-          <p:cNvPr id="15" name="TextBox 14">
-            <a:extLst>
-              <a:ext uri="{FF2B5EF4-FFF2-40B4-BE49-F238E27FC236}">
-                <a16:creationId xmlns:a16="http://schemas.microsoft.com/office/drawing/2014/main" id="{4BDF2F06-66B9-CD63-E5BB-B1CFA854C2C6}"/>
-              </a:ext>
-            </a:extLst>
-          </p:cNvPr>
-          <p:cNvSpPr txBox="1"/>
-          <p:nvPr/>
-        </p:nvSpPr>
-        <p:spPr>
-          <a:xfrm>
-            <a:off x="7928631" y="1022213"/>
-            <a:ext cx="2677531" cy="2092881"/>
-          </a:xfrm>
-          <a:prstGeom prst="rect">
-            <a:avLst/>
-          </a:prstGeom>
-          <a:noFill/>
-        </p:spPr>
-        <p:txBody>
-          <a:bodyPr wrap="square" rtlCol="0">
-            <a:spAutoFit/>
-          </a:bodyPr>
-          <a:lstStyle/>
-          <a:p>
-            <a:r>
-              <a:rPr lang="en-US" sz="2000" dirty="0"/>
-              <a:t>Categories</a:t>
-            </a:r>
-          </a:p>
-          <a:p>
-            <a:pPr marL="342900" indent="-342900">
-              <a:buFont typeface="Arial" panose="020B0604020202020204" pitchFamily="34" charset="0"/>
-              <a:buChar char="•"/>
-            </a:pPr>
-            <a:r>
-              <a:rPr lang="en-US" sz="2000" dirty="0"/>
-              <a:t>Create/Update/Delete</a:t>
-            </a:r>
-          </a:p>
-          <a:p>
-            <a:pPr marL="342900" indent="-342900">
-              <a:buFont typeface="Arial" panose="020B0604020202020204" pitchFamily="34" charset="0"/>
-              <a:buChar char="•"/>
-            </a:pPr>
-            <a:r>
-              <a:rPr lang="en-US" dirty="0"/>
-              <a:t>Get All/By Id/By name</a:t>
-            </a:r>
-          </a:p>
-          <a:p>
-            <a:pPr marL="342900" indent="-342900">
-              <a:buFont typeface="Arial" panose="020B0604020202020204" pitchFamily="34" charset="0"/>
-              <a:buChar char="•"/>
-            </a:pPr>
-            <a:endParaRPr lang="en-US" dirty="0"/>
-          </a:p>
-          <a:p>
-            <a:pPr marL="342900" indent="-342900">
-              <a:buFont typeface="Arial" panose="020B0604020202020204" pitchFamily="34" charset="0"/>
-              <a:buChar char="•"/>
-            </a:pPr>
-            <a:endParaRPr lang="en-US" dirty="0"/>
-          </a:p>
-          <a:p>
-            <a:pPr marL="342900" indent="-342900">
-              <a:buFont typeface="Arial" panose="020B0604020202020204" pitchFamily="34" charset="0"/>
-              <a:buChar char="•"/>
-            </a:pPr>
-            <a:endParaRPr lang="en-US" dirty="0"/>
-          </a:p>
-          <a:p>
-            <a:pPr marL="285750" indent="-285750">
-              <a:buFont typeface="Arial" panose="020B0604020202020204" pitchFamily="34" charset="0"/>
-              <a:buChar char="•"/>
-            </a:pPr>
-            <a:endParaRPr lang="en-GB" dirty="0"/>
-          </a:p>
-        </p:txBody>
-      </p:sp>
-      <p:sp>
-        <p:nvSpPr>
-          <p:cNvPr id="18" name="TextBox 17">
-            <a:extLst>
-              <a:ext uri="{FF2B5EF4-FFF2-40B4-BE49-F238E27FC236}">
-                <a16:creationId xmlns:a16="http://schemas.microsoft.com/office/drawing/2014/main" id="{B59BB87F-8424-5014-D895-D85C1C2AABE2}"/>
-              </a:ext>
-            </a:extLst>
-          </p:cNvPr>
-          <p:cNvSpPr txBox="1"/>
-          <p:nvPr/>
-        </p:nvSpPr>
-        <p:spPr>
-          <a:xfrm>
-            <a:off x="629426" y="2951992"/>
-            <a:ext cx="2677531" cy="2431435"/>
-          </a:xfrm>
-          <a:prstGeom prst="rect">
-            <a:avLst/>
-          </a:prstGeom>
-          <a:noFill/>
-        </p:spPr>
-        <p:txBody>
-          <a:bodyPr wrap="square" rtlCol="0">
-            <a:spAutoFit/>
-          </a:bodyPr>
-          <a:lstStyle/>
-          <a:p>
-            <a:r>
-              <a:rPr lang="en-US" sz="2000" dirty="0"/>
-              <a:t>Scheduled Payments</a:t>
-            </a:r>
-          </a:p>
-          <a:p>
-            <a:pPr marL="342900" indent="-342900">
-              <a:buFont typeface="Arial" panose="020B0604020202020204" pitchFamily="34" charset="0"/>
-              <a:buChar char="•"/>
-            </a:pPr>
-            <a:r>
-              <a:rPr lang="en-US" sz="2000" dirty="0"/>
-              <a:t>Create/Update/Delete</a:t>
-            </a:r>
-          </a:p>
-          <a:p>
-            <a:pPr marL="342900" indent="-342900">
-              <a:buFont typeface="Arial" panose="020B0604020202020204" pitchFamily="34" charset="0"/>
-              <a:buChar char="•"/>
-            </a:pPr>
-            <a:r>
-              <a:rPr lang="en-US" sz="2000" dirty="0"/>
-              <a:t>Get By Id</a:t>
-            </a:r>
-          </a:p>
-          <a:p>
-            <a:pPr marL="342900" indent="-342900">
-              <a:buFont typeface="Arial" panose="020B0604020202020204" pitchFamily="34" charset="0"/>
-              <a:buChar char="•"/>
-            </a:pPr>
-            <a:r>
-              <a:rPr lang="en-US" sz="2000" dirty="0"/>
-              <a:t>Get All</a:t>
-            </a:r>
-          </a:p>
-          <a:p>
-            <a:pPr marL="342900" indent="-342900">
-              <a:buFont typeface="Arial" panose="020B0604020202020204" pitchFamily="34" charset="0"/>
-              <a:buChar char="•"/>
-            </a:pPr>
-            <a:endParaRPr lang="en-US" dirty="0"/>
-          </a:p>
-          <a:p>
-            <a:pPr marL="342900" indent="-342900">
-              <a:buFont typeface="Arial" panose="020B0604020202020204" pitchFamily="34" charset="0"/>
-              <a:buChar char="•"/>
-            </a:pPr>
-            <a:endParaRPr lang="en-US" dirty="0"/>
-          </a:p>
-          <a:p>
-            <a:pPr marL="342900" indent="-342900">
-              <a:buFont typeface="Arial" panose="020B0604020202020204" pitchFamily="34" charset="0"/>
-              <a:buChar char="•"/>
-            </a:pPr>
-            <a:endParaRPr lang="en-US" dirty="0"/>
-          </a:p>
-          <a:p>
-            <a:pPr marL="285750" indent="-285750">
-              <a:buFont typeface="Arial" panose="020B0604020202020204" pitchFamily="34" charset="0"/>
-              <a:buChar char="•"/>
-            </a:pPr>
-            <a:endParaRPr lang="en-GB" dirty="0"/>
-          </a:p>
-        </p:txBody>
-      </p:sp>
-      <p:sp>
-        <p:nvSpPr>
-          <p:cNvPr id="21" name="TextBox 20">
-            <a:extLst>
-              <a:ext uri="{FF2B5EF4-FFF2-40B4-BE49-F238E27FC236}">
-                <a16:creationId xmlns:a16="http://schemas.microsoft.com/office/drawing/2014/main" id="{9899B44A-1EBE-E8E6-B85F-8C8F0DC8C352}"/>
-              </a:ext>
-            </a:extLst>
-          </p:cNvPr>
-          <p:cNvSpPr txBox="1"/>
-          <p:nvPr/>
-        </p:nvSpPr>
-        <p:spPr>
-          <a:xfrm>
-            <a:off x="3087030" y="2813447"/>
-            <a:ext cx="2677531" cy="3046988"/>
-          </a:xfrm>
-          <a:prstGeom prst="rect">
-            <a:avLst/>
-          </a:prstGeom>
-          <a:noFill/>
-        </p:spPr>
-        <p:txBody>
-          <a:bodyPr wrap="square" rtlCol="0">
-            <a:spAutoFit/>
-          </a:bodyPr>
-          <a:lstStyle/>
-          <a:p>
-            <a:r>
-              <a:rPr lang="en-US" sz="2000" dirty="0"/>
-              <a:t>Transactions</a:t>
-            </a:r>
-          </a:p>
-          <a:p>
-            <a:pPr marL="342900" indent="-342900">
-              <a:buFont typeface="Arial" panose="020B0604020202020204" pitchFamily="34" charset="0"/>
-              <a:buChar char="•"/>
-            </a:pPr>
-            <a:r>
-              <a:rPr lang="en-US" sz="2000" dirty="0"/>
-              <a:t>Create</a:t>
-            </a:r>
-          </a:p>
-          <a:p>
-            <a:pPr marL="342900" indent="-342900">
-              <a:buFont typeface="Arial" panose="020B0604020202020204" pitchFamily="34" charset="0"/>
-              <a:buChar char="•"/>
-            </a:pPr>
-            <a:r>
-              <a:rPr lang="en-US" sz="2000" dirty="0"/>
-              <a:t>Get All/By Id</a:t>
-            </a:r>
-          </a:p>
-          <a:p>
-            <a:pPr marL="342900" indent="-342900">
-              <a:buFont typeface="Arial" panose="020B0604020202020204" pitchFamily="34" charset="0"/>
-              <a:buChar char="•"/>
-            </a:pPr>
-            <a:r>
-              <a:rPr lang="en-US" sz="2000" dirty="0"/>
-              <a:t>Get All filtered</a:t>
-            </a:r>
-          </a:p>
-          <a:p>
-            <a:pPr marL="342900" indent="-342900">
-              <a:buFont typeface="Arial" panose="020B0604020202020204" pitchFamily="34" charset="0"/>
-              <a:buChar char="•"/>
-            </a:pPr>
-            <a:r>
-              <a:rPr lang="en-US" sz="2000" dirty="0"/>
-              <a:t>Download reference</a:t>
-            </a:r>
-          </a:p>
-          <a:p>
-            <a:endParaRPr lang="en-US" sz="2000" dirty="0"/>
-          </a:p>
-          <a:p>
-            <a:pPr marL="342900" indent="-342900">
-              <a:buFont typeface="Arial" panose="020B0604020202020204" pitchFamily="34" charset="0"/>
-              <a:buChar char="•"/>
-            </a:pPr>
-            <a:endParaRPr lang="en-US" dirty="0"/>
-          </a:p>
-          <a:p>
-            <a:pPr marL="342900" indent="-342900">
-              <a:buFont typeface="Arial" panose="020B0604020202020204" pitchFamily="34" charset="0"/>
-              <a:buChar char="•"/>
-            </a:pPr>
-            <a:endParaRPr lang="en-US" dirty="0"/>
-          </a:p>
-          <a:p>
-            <a:pPr marL="342900" indent="-342900">
-              <a:buFont typeface="Arial" panose="020B0604020202020204" pitchFamily="34" charset="0"/>
-              <a:buChar char="•"/>
-            </a:pPr>
-            <a:endParaRPr lang="en-US" dirty="0"/>
-          </a:p>
-          <a:p>
-            <a:pPr marL="285750" indent="-285750">
-              <a:buFont typeface="Arial" panose="020B0604020202020204" pitchFamily="34" charset="0"/>
-              <a:buChar char="•"/>
-            </a:pPr>
-            <a:endParaRPr lang="en-GB" dirty="0"/>
-          </a:p>
-        </p:txBody>
-      </p:sp>
-      <p:sp>
-        <p:nvSpPr>
-          <p:cNvPr id="24" name="TextBox 23">
-            <a:extLst>
-              <a:ext uri="{FF2B5EF4-FFF2-40B4-BE49-F238E27FC236}">
-                <a16:creationId xmlns:a16="http://schemas.microsoft.com/office/drawing/2014/main" id="{76F6C45F-DDE6-6BE7-F16F-F6F69D26B166}"/>
-              </a:ext>
-            </a:extLst>
-          </p:cNvPr>
-          <p:cNvSpPr txBox="1"/>
-          <p:nvPr/>
-        </p:nvSpPr>
-        <p:spPr>
-          <a:xfrm>
-            <a:off x="5617794" y="2813447"/>
-            <a:ext cx="2677531" cy="3354765"/>
-          </a:xfrm>
-          <a:prstGeom prst="rect">
-            <a:avLst/>
-          </a:prstGeom>
-          <a:noFill/>
-        </p:spPr>
-        <p:txBody>
-          <a:bodyPr wrap="square" rtlCol="0">
-            <a:spAutoFit/>
-          </a:bodyPr>
-          <a:lstStyle/>
-          <a:p>
-            <a:r>
-              <a:rPr lang="en-US" sz="2000" dirty="0"/>
-              <a:t>Transfers</a:t>
-            </a:r>
-          </a:p>
-          <a:p>
-            <a:pPr marL="342900" indent="-342900">
-              <a:buFont typeface="Arial" panose="020B0604020202020204" pitchFamily="34" charset="0"/>
-              <a:buChar char="•"/>
-            </a:pPr>
-            <a:r>
-              <a:rPr lang="en-US" sz="2000" dirty="0"/>
-              <a:t>Create</a:t>
-            </a:r>
-          </a:p>
-          <a:p>
-            <a:pPr marL="342900" indent="-342900">
-              <a:buFont typeface="Arial" panose="020B0604020202020204" pitchFamily="34" charset="0"/>
-              <a:buChar char="•"/>
-            </a:pPr>
-            <a:r>
-              <a:rPr lang="en-US" sz="2000" dirty="0"/>
-              <a:t>Get All sent/received</a:t>
-            </a:r>
-          </a:p>
-          <a:p>
-            <a:pPr marL="342900" indent="-342900">
-              <a:buFont typeface="Arial" panose="020B0604020202020204" pitchFamily="34" charset="0"/>
-              <a:buChar char="•"/>
-            </a:pPr>
-            <a:r>
-              <a:rPr lang="en-US" sz="2000" dirty="0"/>
-              <a:t>Get By Id</a:t>
-            </a:r>
-          </a:p>
-          <a:p>
-            <a:pPr marL="342900" indent="-342900">
-              <a:buFont typeface="Arial" panose="020B0604020202020204" pitchFamily="34" charset="0"/>
-              <a:buChar char="•"/>
-            </a:pPr>
-            <a:r>
-              <a:rPr lang="en-US" sz="2000" dirty="0"/>
-              <a:t>Get All Filtered</a:t>
-            </a:r>
-          </a:p>
-          <a:p>
-            <a:pPr marL="342900" indent="-342900">
-              <a:buFont typeface="Arial" panose="020B0604020202020204" pitchFamily="34" charset="0"/>
-              <a:buChar char="•"/>
-            </a:pPr>
-            <a:r>
-              <a:rPr lang="en-US" sz="2000" dirty="0"/>
-              <a:t>Download reference</a:t>
-            </a:r>
-          </a:p>
-          <a:p>
-            <a:endParaRPr lang="en-US" sz="2000" dirty="0"/>
-          </a:p>
-          <a:p>
-            <a:pPr marL="342900" indent="-342900">
-              <a:buFont typeface="Arial" panose="020B0604020202020204" pitchFamily="34" charset="0"/>
-              <a:buChar char="•"/>
-            </a:pPr>
-            <a:endParaRPr lang="en-US" dirty="0"/>
-          </a:p>
-          <a:p>
-            <a:pPr marL="342900" indent="-342900">
-              <a:buFont typeface="Arial" panose="020B0604020202020204" pitchFamily="34" charset="0"/>
-              <a:buChar char="•"/>
-            </a:pPr>
-            <a:endParaRPr lang="en-US" dirty="0"/>
-          </a:p>
-          <a:p>
-            <a:pPr marL="342900" indent="-342900">
-              <a:buFont typeface="Arial" panose="020B0604020202020204" pitchFamily="34" charset="0"/>
-              <a:buChar char="•"/>
-            </a:pPr>
-            <a:endParaRPr lang="en-US" dirty="0"/>
-          </a:p>
-          <a:p>
-            <a:pPr marL="285750" indent="-285750">
-              <a:buFont typeface="Arial" panose="020B0604020202020204" pitchFamily="34" charset="0"/>
-              <a:buChar char="•"/>
-            </a:pPr>
-            <a:endParaRPr lang="en-GB" dirty="0"/>
+              <a:rPr lang="en-US" sz="6000" dirty="0"/>
+              <a:t>Finance Tracker app</a:t>
+            </a:r>
+            <a:endParaRPr lang="en-GB" sz="6000" dirty="0"/>
           </a:p>
         </p:txBody>
       </p:sp>
     </p:spTree>
     <p:extLst>
       <p:ext uri="{BB962C8B-B14F-4D97-AF65-F5344CB8AC3E}">
-        <p14:creationId xmlns:p14="http://schemas.microsoft.com/office/powerpoint/2010/main" val="855215445"/>
+        <p14:creationId xmlns:p14="http://schemas.microsoft.com/office/powerpoint/2010/main" val="3486369787"/>
       </p:ext>
     </p:extLst>
   </p:cSld>
@@ -12309,7 +11682,7 @@
         <p:spPr>
           <a:xfrm>
             <a:off x="1099128" y="775854"/>
-            <a:ext cx="4488872" cy="3016210"/>
+            <a:ext cx="4488872" cy="2431435"/>
           </a:xfrm>
           <a:prstGeom prst="rect">
             <a:avLst/>
@@ -12334,7 +11707,7 @@
             </a:pPr>
             <a:r>
               <a:rPr lang="en-US" sz="2000" dirty="0"/>
-              <a:t> Java 18</a:t>
+              <a:t> Java 17</a:t>
             </a:r>
           </a:p>
           <a:p>
@@ -12366,18 +11739,6 @@
               <a:rPr lang="en-US" sz="2000" dirty="0"/>
               <a:t>Spring Boot</a:t>
             </a:r>
-          </a:p>
-          <a:p>
-            <a:pPr marL="285750" indent="-285750">
-              <a:buFont typeface="Arial" panose="020B0604020202020204" pitchFamily="34" charset="0"/>
-              <a:buChar char="•"/>
-            </a:pPr>
-            <a:r>
-              <a:rPr lang="en-US" sz="2000" dirty="0"/>
-              <a:t>Spring Security </a:t>
-            </a:r>
-          </a:p>
-          <a:p>
             <a:endParaRPr lang="en-US" dirty="0"/>
           </a:p>
           <a:p>
@@ -12503,8 +11864,8 @@
         </p:nvSpPr>
         <p:spPr>
           <a:xfrm>
-            <a:off x="3851564" y="3346424"/>
-            <a:ext cx="4488872" cy="2739211"/>
+            <a:off x="3768436" y="3035158"/>
+            <a:ext cx="4488872" cy="3354765"/>
           </a:xfrm>
           <a:prstGeom prst="rect">
             <a:avLst/>
@@ -12584,6 +11945,28 @@
               <a:rPr lang="en-US" sz="2000" dirty="0"/>
               <a:t>Spring Data JPA</a:t>
             </a:r>
+          </a:p>
+          <a:p>
+            <a:pPr marL="285750" indent="-285750">
+              <a:buFont typeface="Arial" panose="020B0604020202020204" pitchFamily="34" charset="0"/>
+              <a:buChar char="•"/>
+            </a:pPr>
+            <a:r>
+              <a:rPr lang="en-US" sz="2000" dirty="0" err="1"/>
+              <a:t>ModelMapper</a:t>
+            </a:r>
+            <a:endParaRPr lang="en-US" sz="2000" dirty="0"/>
+          </a:p>
+          <a:p>
+            <a:pPr marL="285750" indent="-285750">
+              <a:buFont typeface="Arial" panose="020B0604020202020204" pitchFamily="34" charset="0"/>
+              <a:buChar char="•"/>
+            </a:pPr>
+            <a:r>
+              <a:rPr lang="en-US" sz="2000" dirty="0" err="1"/>
+              <a:t>Bcrypt</a:t>
+            </a:r>
+            <a:endParaRPr lang="en-US" sz="2000" dirty="0"/>
           </a:p>
           <a:p>
             <a:pPr marL="285750" indent="-285750">
@@ -12627,12 +12010,70 @@
           <a:chExt cx="0" cy="0"/>
         </a:xfrm>
       </p:grpSpPr>
+      <p:sp>
+        <p:nvSpPr>
+          <p:cNvPr id="4" name="Slide Number Placeholder 3">
+            <a:extLst>
+              <a:ext uri="{FF2B5EF4-FFF2-40B4-BE49-F238E27FC236}">
+                <a16:creationId xmlns:a16="http://schemas.microsoft.com/office/drawing/2014/main" id="{8C8CA507-6FD4-FFB5-2F2C-7D61DDA2184D}"/>
+              </a:ext>
+            </a:extLst>
+          </p:cNvPr>
+          <p:cNvSpPr>
+            <a:spLocks noGrp="1"/>
+          </p:cNvSpPr>
+          <p:nvPr>
+            <p:ph type="sldNum" sz="quarter" idx="11"/>
+          </p:nvPr>
+        </p:nvSpPr>
+        <p:spPr/>
+        <p:txBody>
+          <a:bodyPr/>
+          <a:lstStyle/>
+          <a:p>
+            <a:fld id="{75DF2D63-3FF5-D547-96B9-BE9CCD1ABA58}" type="slidenum">
+              <a:rPr lang="en-US" smtClean="0"/>
+              <a:t>4</a:t>
+            </a:fld>
+            <a:endParaRPr lang="en-US" dirty="0"/>
+          </a:p>
+        </p:txBody>
+      </p:sp>
+      <p:sp>
+        <p:nvSpPr>
+          <p:cNvPr id="5" name="Footer Placeholder 4">
+            <a:extLst>
+              <a:ext uri="{FF2B5EF4-FFF2-40B4-BE49-F238E27FC236}">
+                <a16:creationId xmlns:a16="http://schemas.microsoft.com/office/drawing/2014/main" id="{093A698F-98E4-C6EC-B6D9-61BB70985FB7}"/>
+              </a:ext>
+            </a:extLst>
+          </p:cNvPr>
+          <p:cNvSpPr>
+            <a:spLocks noGrp="1"/>
+          </p:cNvSpPr>
+          <p:nvPr>
+            <p:ph type="ftr" sz="quarter" idx="12"/>
+          </p:nvPr>
+        </p:nvSpPr>
+        <p:spPr/>
+        <p:txBody>
+          <a:bodyPr/>
+          <a:lstStyle/>
+          <a:p>
+            <a:r>
+              <a:rPr lang="en-US"/>
+              <a:t>presentation title</a:t>
+            </a:r>
+            <a:endParaRPr lang="en-US" dirty="0"/>
+          </a:p>
+        </p:txBody>
+      </p:sp>
       <p:pic>
         <p:nvPicPr>
-          <p:cNvPr id="6" name="Picture 5" descr="Diagram&#10;&#10;Description automatically generated">
-            <a:extLst>
-              <a:ext uri="{FF2B5EF4-FFF2-40B4-BE49-F238E27FC236}">
-                <a16:creationId xmlns:a16="http://schemas.microsoft.com/office/drawing/2014/main" id="{97C2E713-2C2A-246F-3941-F43AE06EE4BA}"/>
+          <p:cNvPr id="11" name="Picture 10">
+            <a:extLst>
+              <a:ext uri="{FF2B5EF4-FFF2-40B4-BE49-F238E27FC236}">
+                <a16:creationId xmlns:a16="http://schemas.microsoft.com/office/drawing/2014/main" id="{53F47939-00B5-5D8E-1293-F5F8196CF4D5}"/>
               </a:ext>
             </a:extLst>
           </p:cNvPr>
@@ -12649,55 +12090,168 @@
         </p:blipFill>
         <p:spPr>
           <a:xfrm>
-            <a:off x="3546764" y="0"/>
-            <a:ext cx="8134264" cy="6858000"/>
+            <a:off x="324940" y="312736"/>
+            <a:ext cx="3000375" cy="2466975"/>
           </a:xfrm>
           <a:prstGeom prst="rect">
             <a:avLst/>
           </a:prstGeom>
-          <a:noFill/>
         </p:spPr>
       </p:pic>
-      <p:sp>
-        <p:nvSpPr>
-          <p:cNvPr id="7" name="TextBox 6">
-            <a:extLst>
-              <a:ext uri="{FF2B5EF4-FFF2-40B4-BE49-F238E27FC236}">
-                <a16:creationId xmlns:a16="http://schemas.microsoft.com/office/drawing/2014/main" id="{0877B1F2-F86A-E291-4545-2B759C7A7568}"/>
-              </a:ext>
-            </a:extLst>
-          </p:cNvPr>
-          <p:cNvSpPr txBox="1"/>
+      <p:pic>
+        <p:nvPicPr>
+          <p:cNvPr id="15" name="Picture 14">
+            <a:extLst>
+              <a:ext uri="{FF2B5EF4-FFF2-40B4-BE49-F238E27FC236}">
+                <a16:creationId xmlns:a16="http://schemas.microsoft.com/office/drawing/2014/main" id="{B05D162A-AA50-612E-5493-2ED17E2CBD08}"/>
+              </a:ext>
+            </a:extLst>
+          </p:cNvPr>
+          <p:cNvPicPr>
+            <a:picLocks noChangeAspect="1"/>
+          </p:cNvPicPr>
           <p:nvPr/>
-        </p:nvSpPr>
-        <p:spPr>
-          <a:xfrm>
-            <a:off x="914400" y="1172895"/>
-            <a:ext cx="2004290" cy="584775"/>
+        </p:nvPicPr>
+        <p:blipFill>
+          <a:blip r:embed="rId3"/>
+          <a:stretch>
+            <a:fillRect/>
+          </a:stretch>
+        </p:blipFill>
+        <p:spPr>
+          <a:xfrm>
+            <a:off x="4272904" y="3913184"/>
+            <a:ext cx="2838450" cy="2400300"/>
           </a:xfrm>
           <a:prstGeom prst="rect">
             <a:avLst/>
           </a:prstGeom>
-          <a:noFill/>
-        </p:spPr>
-        <p:txBody>
-          <a:bodyPr wrap="square" rtlCol="0">
-            <a:spAutoFit/>
-          </a:bodyPr>
-          <a:lstStyle/>
-          <a:p>
-            <a:r>
-              <a:rPr lang="en-US" sz="3200" dirty="0"/>
-              <a:t>DB Diagram</a:t>
-            </a:r>
-            <a:endParaRPr lang="en-GB" sz="3200" dirty="0"/>
-          </a:p>
-        </p:txBody>
-      </p:sp>
+        </p:spPr>
+      </p:pic>
+      <p:pic>
+        <p:nvPicPr>
+          <p:cNvPr id="17" name="Picture 16">
+            <a:extLst>
+              <a:ext uri="{FF2B5EF4-FFF2-40B4-BE49-F238E27FC236}">
+                <a16:creationId xmlns:a16="http://schemas.microsoft.com/office/drawing/2014/main" id="{EDA767EE-D51D-08F0-3B70-34655F517F60}"/>
+              </a:ext>
+            </a:extLst>
+          </p:cNvPr>
+          <p:cNvPicPr>
+            <a:picLocks noChangeAspect="1"/>
+          </p:cNvPicPr>
+          <p:nvPr/>
+        </p:nvPicPr>
+        <p:blipFill>
+          <a:blip r:embed="rId4"/>
+          <a:stretch>
+            <a:fillRect/>
+          </a:stretch>
+        </p:blipFill>
+        <p:spPr>
+          <a:xfrm>
+            <a:off x="7648934" y="477839"/>
+            <a:ext cx="2590800" cy="2228850"/>
+          </a:xfrm>
+          <a:prstGeom prst="rect">
+            <a:avLst/>
+          </a:prstGeom>
+        </p:spPr>
+      </p:pic>
+      <p:pic>
+        <p:nvPicPr>
+          <p:cNvPr id="19" name="Picture 18">
+            <a:extLst>
+              <a:ext uri="{FF2B5EF4-FFF2-40B4-BE49-F238E27FC236}">
+                <a16:creationId xmlns:a16="http://schemas.microsoft.com/office/drawing/2014/main" id="{0A5DB71E-38F4-FCEE-4352-E3B0E0E1CC0A}"/>
+              </a:ext>
+            </a:extLst>
+          </p:cNvPr>
+          <p:cNvPicPr>
+            <a:picLocks noChangeAspect="1"/>
+          </p:cNvPicPr>
+          <p:nvPr/>
+        </p:nvPicPr>
+        <p:blipFill>
+          <a:blip r:embed="rId5"/>
+          <a:stretch>
+            <a:fillRect/>
+          </a:stretch>
+        </p:blipFill>
+        <p:spPr>
+          <a:xfrm>
+            <a:off x="7648934" y="2708274"/>
+            <a:ext cx="2905125" cy="2886075"/>
+          </a:xfrm>
+          <a:prstGeom prst="rect">
+            <a:avLst/>
+          </a:prstGeom>
+        </p:spPr>
+      </p:pic>
+      <p:pic>
+        <p:nvPicPr>
+          <p:cNvPr id="25" name="Picture 24">
+            <a:extLst>
+              <a:ext uri="{FF2B5EF4-FFF2-40B4-BE49-F238E27FC236}">
+                <a16:creationId xmlns:a16="http://schemas.microsoft.com/office/drawing/2014/main" id="{F77BA787-A9ED-63A4-7352-BCB9C9B205B5}"/>
+              </a:ext>
+            </a:extLst>
+          </p:cNvPr>
+          <p:cNvPicPr>
+            <a:picLocks noChangeAspect="1"/>
+          </p:cNvPicPr>
+          <p:nvPr/>
+        </p:nvPicPr>
+        <p:blipFill>
+          <a:blip r:embed="rId6"/>
+          <a:stretch>
+            <a:fillRect/>
+          </a:stretch>
+        </p:blipFill>
+        <p:spPr>
+          <a:xfrm>
+            <a:off x="649224" y="2706689"/>
+            <a:ext cx="2857500" cy="3838575"/>
+          </a:xfrm>
+          <a:prstGeom prst="rect">
+            <a:avLst/>
+          </a:prstGeom>
+        </p:spPr>
+      </p:pic>
+      <p:pic>
+        <p:nvPicPr>
+          <p:cNvPr id="27" name="Picture 26">
+            <a:extLst>
+              <a:ext uri="{FF2B5EF4-FFF2-40B4-BE49-F238E27FC236}">
+                <a16:creationId xmlns:a16="http://schemas.microsoft.com/office/drawing/2014/main" id="{63E815D0-3C07-5FBC-EC5E-6B9065AD15FB}"/>
+              </a:ext>
+            </a:extLst>
+          </p:cNvPr>
+          <p:cNvPicPr>
+            <a:picLocks noChangeAspect="1"/>
+          </p:cNvPicPr>
+          <p:nvPr/>
+        </p:nvPicPr>
+        <p:blipFill>
+          <a:blip r:embed="rId7"/>
+          <a:stretch>
+            <a:fillRect/>
+          </a:stretch>
+        </p:blipFill>
+        <p:spPr>
+          <a:xfrm>
+            <a:off x="4330054" y="255584"/>
+            <a:ext cx="2724150" cy="3657600"/>
+          </a:xfrm>
+          <a:prstGeom prst="rect">
+            <a:avLst/>
+          </a:prstGeom>
+        </p:spPr>
+      </p:pic>
     </p:spTree>
     <p:extLst>
       <p:ext uri="{BB962C8B-B14F-4D97-AF65-F5344CB8AC3E}">
-        <p14:creationId xmlns:p14="http://schemas.microsoft.com/office/powerpoint/2010/main" val="4157965777"/>
+        <p14:creationId xmlns:p14="http://schemas.microsoft.com/office/powerpoint/2010/main" val="1456139332"/>
       </p:ext>
     </p:extLst>
   </p:cSld>
@@ -12724,122 +12278,866 @@
           <a:chExt cx="0" cy="0"/>
         </a:xfrm>
       </p:grpSpPr>
-      <p:sp>
-        <p:nvSpPr>
-          <p:cNvPr id="2" name="Title 1">
-            <a:extLst>
-              <a:ext uri="{FF2B5EF4-FFF2-40B4-BE49-F238E27FC236}">
-                <a16:creationId xmlns:a16="http://schemas.microsoft.com/office/drawing/2014/main" id="{B676D44B-377F-68A9-5B8B-C25EFD68FA2E}"/>
-              </a:ext>
-            </a:extLst>
-          </p:cNvPr>
-          <p:cNvSpPr>
-            <a:spLocks noGrp="1"/>
-          </p:cNvSpPr>
-          <p:nvPr>
-            <p:ph type="title"/>
-          </p:nvPr>
-        </p:nvSpPr>
-        <p:spPr/>
-        <p:txBody>
-          <a:bodyPr/>
-          <a:lstStyle/>
-          <a:p>
-            <a:r>
-              <a:rPr lang="en-US" dirty="0"/>
-              <a:t>Class Diagram???</a:t>
-            </a:r>
-            <a:endParaRPr lang="en-GB" dirty="0"/>
-          </a:p>
-        </p:txBody>
-      </p:sp>
-      <p:sp>
-        <p:nvSpPr>
-          <p:cNvPr id="3" name="Content Placeholder 2">
-            <a:extLst>
-              <a:ext uri="{FF2B5EF4-FFF2-40B4-BE49-F238E27FC236}">
-                <a16:creationId xmlns:a16="http://schemas.microsoft.com/office/drawing/2014/main" id="{557B086A-6324-2D7C-1A26-63CB35314706}"/>
-              </a:ext>
-            </a:extLst>
-          </p:cNvPr>
-          <p:cNvSpPr>
-            <a:spLocks noGrp="1"/>
-          </p:cNvSpPr>
-          <p:nvPr>
-            <p:ph idx="1"/>
-          </p:nvPr>
-        </p:nvSpPr>
-        <p:spPr/>
-        <p:txBody>
-          <a:bodyPr/>
-          <a:lstStyle/>
-          <a:p>
-            <a:endParaRPr lang="en-GB" dirty="0"/>
-          </a:p>
-        </p:txBody>
-      </p:sp>
-      <p:sp>
-        <p:nvSpPr>
-          <p:cNvPr id="4" name="Slide Number Placeholder 3">
-            <a:extLst>
-              <a:ext uri="{FF2B5EF4-FFF2-40B4-BE49-F238E27FC236}">
-                <a16:creationId xmlns:a16="http://schemas.microsoft.com/office/drawing/2014/main" id="{8C8CA507-6FD4-FFB5-2F2C-7D61DDA2184D}"/>
-              </a:ext>
-            </a:extLst>
-          </p:cNvPr>
-          <p:cNvSpPr>
-            <a:spLocks noGrp="1"/>
-          </p:cNvSpPr>
-          <p:nvPr>
-            <p:ph type="sldNum" sz="quarter" idx="11"/>
-          </p:nvPr>
-        </p:nvSpPr>
-        <p:spPr/>
-        <p:txBody>
-          <a:bodyPr/>
-          <a:lstStyle/>
-          <a:p>
-            <a:fld id="{75DF2D63-3FF5-D547-96B9-BE9CCD1ABA58}" type="slidenum">
-              <a:rPr lang="en-US" smtClean="0"/>
-              <a:t>5</a:t>
-            </a:fld>
-            <a:endParaRPr lang="en-US" dirty="0"/>
-          </a:p>
-        </p:txBody>
-      </p:sp>
-      <p:sp>
-        <p:nvSpPr>
-          <p:cNvPr id="5" name="Footer Placeholder 4">
-            <a:extLst>
-              <a:ext uri="{FF2B5EF4-FFF2-40B4-BE49-F238E27FC236}">
-                <a16:creationId xmlns:a16="http://schemas.microsoft.com/office/drawing/2014/main" id="{093A698F-98E4-C6EC-B6D9-61BB70985FB7}"/>
-              </a:ext>
-            </a:extLst>
-          </p:cNvPr>
-          <p:cNvSpPr>
-            <a:spLocks noGrp="1"/>
-          </p:cNvSpPr>
-          <p:nvPr>
-            <p:ph type="ftr" sz="quarter" idx="12"/>
-          </p:nvPr>
-        </p:nvSpPr>
-        <p:spPr/>
-        <p:txBody>
-          <a:bodyPr/>
-          <a:lstStyle/>
-          <a:p>
-            <a:r>
-              <a:rPr lang="en-US"/>
-              <a:t>presentation title</a:t>
-            </a:r>
-            <a:endParaRPr lang="en-US" dirty="0"/>
-          </a:p>
-        </p:txBody>
-      </p:sp>
+      <p:pic>
+        <p:nvPicPr>
+          <p:cNvPr id="5" name="Picture 4" descr="Diagram&#10;&#10;Description automatically generated with medium confidence">
+            <a:extLst>
+              <a:ext uri="{FF2B5EF4-FFF2-40B4-BE49-F238E27FC236}">
+                <a16:creationId xmlns:a16="http://schemas.microsoft.com/office/drawing/2014/main" id="{6E6149E6-16AE-8F55-812A-C2D476CD6AD5}"/>
+              </a:ext>
+            </a:extLst>
+          </p:cNvPr>
+          <p:cNvPicPr>
+            <a:picLocks noChangeAspect="1"/>
+          </p:cNvPicPr>
+          <p:nvPr/>
+        </p:nvPicPr>
+        <p:blipFill>
+          <a:blip r:embed="rId2"/>
+          <a:stretch>
+            <a:fillRect/>
+          </a:stretch>
+        </p:blipFill>
+        <p:spPr>
+          <a:xfrm>
+            <a:off x="1106006" y="0"/>
+            <a:ext cx="10121783" cy="6943725"/>
+          </a:xfrm>
+          <a:prstGeom prst="rect">
+            <a:avLst/>
+          </a:prstGeom>
+        </p:spPr>
+      </p:pic>
     </p:spTree>
     <p:extLst>
       <p:ext uri="{BB962C8B-B14F-4D97-AF65-F5344CB8AC3E}">
-        <p14:creationId xmlns:p14="http://schemas.microsoft.com/office/powerpoint/2010/main" val="1456139332"/>
+        <p14:creationId xmlns:p14="http://schemas.microsoft.com/office/powerpoint/2010/main" val="4157965777"/>
+      </p:ext>
+    </p:extLst>
+  </p:cSld>
+  <p:clrMapOvr>
+    <a:masterClrMapping/>
+  </p:clrMapOvr>
+</p:sld>
+</file>
+
+<file path=ppt/slides/slide6.xml><?xml version="1.0" encoding="utf-8"?>
+<p:sld xmlns:a="http://schemas.openxmlformats.org/drawingml/2006/main" xmlns:r="http://schemas.openxmlformats.org/officeDocument/2006/relationships" xmlns:p="http://schemas.openxmlformats.org/presentationml/2006/main">
+  <p:cSld>
+    <p:spTree>
+      <p:nvGrpSpPr>
+        <p:cNvPr id="1" name=""/>
+        <p:cNvGrpSpPr/>
+        <p:nvPr/>
+      </p:nvGrpSpPr>
+      <p:grpSpPr>
+        <a:xfrm>
+          <a:off x="0" y="0"/>
+          <a:ext cx="0" cy="0"/>
+          <a:chOff x="0" y="0"/>
+          <a:chExt cx="0" cy="0"/>
+        </a:xfrm>
+      </p:grpSpPr>
+      <p:sp>
+        <p:nvSpPr>
+          <p:cNvPr id="11" name="TextBox 10">
+            <a:extLst>
+              <a:ext uri="{FF2B5EF4-FFF2-40B4-BE49-F238E27FC236}">
+                <a16:creationId xmlns:a16="http://schemas.microsoft.com/office/drawing/2014/main" id="{1A16B87E-7AA5-32CF-AD71-4274ACD1FDD5}"/>
+              </a:ext>
+            </a:extLst>
+          </p:cNvPr>
+          <p:cNvSpPr txBox="1"/>
+          <p:nvPr/>
+        </p:nvSpPr>
+        <p:spPr>
+          <a:xfrm>
+            <a:off x="3500582" y="249383"/>
+            <a:ext cx="5190836" cy="584775"/>
+          </a:xfrm>
+          <a:prstGeom prst="rect">
+            <a:avLst/>
+          </a:prstGeom>
+          <a:noFill/>
+        </p:spPr>
+        <p:txBody>
+          <a:bodyPr wrap="square" rtlCol="0">
+            <a:spAutoFit/>
+          </a:bodyPr>
+          <a:lstStyle/>
+          <a:p>
+            <a:pPr algn="ctr"/>
+            <a:r>
+              <a:rPr lang="en-US" sz="3200" dirty="0"/>
+              <a:t>Finance Tracker App</a:t>
+            </a:r>
+            <a:endParaRPr lang="en-GB" sz="3200" dirty="0"/>
+          </a:p>
+        </p:txBody>
+      </p:sp>
+      <p:sp>
+        <p:nvSpPr>
+          <p:cNvPr id="12" name="TextBox 11">
+            <a:extLst>
+              <a:ext uri="{FF2B5EF4-FFF2-40B4-BE49-F238E27FC236}">
+                <a16:creationId xmlns:a16="http://schemas.microsoft.com/office/drawing/2014/main" id="{1EB7F556-9762-587D-5107-E44777AEC12D}"/>
+              </a:ext>
+            </a:extLst>
+          </p:cNvPr>
+          <p:cNvSpPr txBox="1"/>
+          <p:nvPr/>
+        </p:nvSpPr>
+        <p:spPr>
+          <a:xfrm>
+            <a:off x="833694" y="1271351"/>
+            <a:ext cx="2530764" cy="2400657"/>
+          </a:xfrm>
+          <a:prstGeom prst="rect">
+            <a:avLst/>
+          </a:prstGeom>
+          <a:noFill/>
+        </p:spPr>
+        <p:txBody>
+          <a:bodyPr wrap="square" rtlCol="0">
+            <a:spAutoFit/>
+          </a:bodyPr>
+          <a:lstStyle/>
+          <a:p>
+            <a:r>
+              <a:rPr lang="en-US" sz="2000" dirty="0"/>
+              <a:t>Users</a:t>
+            </a:r>
+          </a:p>
+          <a:p>
+            <a:pPr marL="342900" indent="-342900">
+              <a:buFont typeface="Arial" panose="020B0604020202020204" pitchFamily="34" charset="0"/>
+              <a:buChar char="•"/>
+            </a:pPr>
+            <a:r>
+              <a:rPr lang="en-US" dirty="0"/>
+              <a:t>Register</a:t>
+            </a:r>
+          </a:p>
+          <a:p>
+            <a:pPr marL="342900" indent="-342900">
+              <a:buFont typeface="Arial" panose="020B0604020202020204" pitchFamily="34" charset="0"/>
+              <a:buChar char="•"/>
+            </a:pPr>
+            <a:r>
+              <a:rPr lang="en-US" dirty="0"/>
+              <a:t>Login – Logout</a:t>
+            </a:r>
+          </a:p>
+          <a:p>
+            <a:pPr marL="342900" indent="-342900">
+              <a:buFont typeface="Arial" panose="020B0604020202020204" pitchFamily="34" charset="0"/>
+              <a:buChar char="•"/>
+            </a:pPr>
+            <a:r>
+              <a:rPr lang="en-US" dirty="0"/>
+              <a:t>Forgotten Password</a:t>
+            </a:r>
+          </a:p>
+          <a:p>
+            <a:pPr marL="342900" indent="-342900">
+              <a:buFont typeface="Arial" panose="020B0604020202020204" pitchFamily="34" charset="0"/>
+              <a:buChar char="•"/>
+            </a:pPr>
+            <a:r>
+              <a:rPr lang="en-US" dirty="0"/>
+              <a:t>Update profile</a:t>
+            </a:r>
+          </a:p>
+          <a:p>
+            <a:pPr marL="342900" indent="-342900">
+              <a:buFont typeface="Arial" panose="020B0604020202020204" pitchFamily="34" charset="0"/>
+              <a:buChar char="•"/>
+            </a:pPr>
+            <a:endParaRPr lang="en-US" dirty="0"/>
+          </a:p>
+          <a:p>
+            <a:pPr marL="342900" indent="-342900">
+              <a:buFont typeface="Arial" panose="020B0604020202020204" pitchFamily="34" charset="0"/>
+              <a:buChar char="•"/>
+            </a:pPr>
+            <a:endParaRPr lang="en-US" dirty="0"/>
+          </a:p>
+          <a:p>
+            <a:pPr marL="285750" indent="-285750">
+              <a:buFont typeface="Arial" panose="020B0604020202020204" pitchFamily="34" charset="0"/>
+              <a:buChar char="•"/>
+            </a:pPr>
+            <a:endParaRPr lang="en-GB" dirty="0"/>
+          </a:p>
+        </p:txBody>
+      </p:sp>
+      <p:sp>
+        <p:nvSpPr>
+          <p:cNvPr id="13" name="TextBox 12">
+            <a:extLst>
+              <a:ext uri="{FF2B5EF4-FFF2-40B4-BE49-F238E27FC236}">
+                <a16:creationId xmlns:a16="http://schemas.microsoft.com/office/drawing/2014/main" id="{89CBBF1E-B26F-C006-4E89-AA8166DEC5CF}"/>
+              </a:ext>
+            </a:extLst>
+          </p:cNvPr>
+          <p:cNvSpPr txBox="1"/>
+          <p:nvPr/>
+        </p:nvSpPr>
+        <p:spPr>
+          <a:xfrm>
+            <a:off x="3291298" y="1271351"/>
+            <a:ext cx="2530764" cy="2062103"/>
+          </a:xfrm>
+          <a:prstGeom prst="rect">
+            <a:avLst/>
+          </a:prstGeom>
+          <a:noFill/>
+        </p:spPr>
+        <p:txBody>
+          <a:bodyPr wrap="square" rtlCol="0">
+            <a:spAutoFit/>
+          </a:bodyPr>
+          <a:lstStyle/>
+          <a:p>
+            <a:r>
+              <a:rPr lang="en-US" sz="2000" dirty="0"/>
+              <a:t>Accounts</a:t>
+            </a:r>
+          </a:p>
+          <a:p>
+            <a:pPr marL="342900" indent="-342900">
+              <a:buFont typeface="Arial" panose="020B0604020202020204" pitchFamily="34" charset="0"/>
+              <a:buChar char="•"/>
+            </a:pPr>
+            <a:r>
+              <a:rPr lang="en-US" dirty="0"/>
+              <a:t>Create/Update/Delete</a:t>
+            </a:r>
+          </a:p>
+          <a:p>
+            <a:pPr marL="342900" indent="-342900">
+              <a:buFont typeface="Arial" panose="020B0604020202020204" pitchFamily="34" charset="0"/>
+              <a:buChar char="•"/>
+            </a:pPr>
+            <a:r>
+              <a:rPr lang="en-US" dirty="0"/>
+              <a:t>Get all own acc</a:t>
+            </a:r>
+          </a:p>
+          <a:p>
+            <a:pPr marL="342900" indent="-342900">
+              <a:buFont typeface="Arial" panose="020B0604020202020204" pitchFamily="34" charset="0"/>
+              <a:buChar char="•"/>
+            </a:pPr>
+            <a:r>
+              <a:rPr lang="en-US" dirty="0"/>
+              <a:t>Add money</a:t>
+            </a:r>
+          </a:p>
+          <a:p>
+            <a:pPr marL="342900" indent="-342900">
+              <a:buFont typeface="Arial" panose="020B0604020202020204" pitchFamily="34" charset="0"/>
+              <a:buChar char="•"/>
+            </a:pPr>
+            <a:endParaRPr lang="en-US" dirty="0"/>
+          </a:p>
+          <a:p>
+            <a:pPr marL="342900" indent="-342900">
+              <a:buFont typeface="Arial" panose="020B0604020202020204" pitchFamily="34" charset="0"/>
+              <a:buChar char="•"/>
+            </a:pPr>
+            <a:endParaRPr lang="en-US" dirty="0"/>
+          </a:p>
+          <a:p>
+            <a:pPr marL="285750" indent="-285750">
+              <a:buFont typeface="Arial" panose="020B0604020202020204" pitchFamily="34" charset="0"/>
+              <a:buChar char="•"/>
+            </a:pPr>
+            <a:endParaRPr lang="en-GB" dirty="0"/>
+          </a:p>
+        </p:txBody>
+      </p:sp>
+      <p:sp>
+        <p:nvSpPr>
+          <p:cNvPr id="14" name="TextBox 13">
+            <a:extLst>
+              <a:ext uri="{FF2B5EF4-FFF2-40B4-BE49-F238E27FC236}">
+                <a16:creationId xmlns:a16="http://schemas.microsoft.com/office/drawing/2014/main" id="{45834FD2-8D3C-2398-901D-41ED5EBE2A80}"/>
+              </a:ext>
+            </a:extLst>
+          </p:cNvPr>
+          <p:cNvSpPr txBox="1"/>
+          <p:nvPr/>
+        </p:nvSpPr>
+        <p:spPr>
+          <a:xfrm>
+            <a:off x="6096000" y="1166925"/>
+            <a:ext cx="2530764" cy="1785104"/>
+          </a:xfrm>
+          <a:prstGeom prst="rect">
+            <a:avLst/>
+          </a:prstGeom>
+          <a:noFill/>
+        </p:spPr>
+        <p:txBody>
+          <a:bodyPr wrap="square" rtlCol="0">
+            <a:spAutoFit/>
+          </a:bodyPr>
+          <a:lstStyle/>
+          <a:p>
+            <a:r>
+              <a:rPr lang="en-US" sz="2000" dirty="0"/>
+              <a:t>Budgets</a:t>
+            </a:r>
+          </a:p>
+          <a:p>
+            <a:pPr marL="342900" indent="-342900">
+              <a:buFont typeface="Arial" panose="020B0604020202020204" pitchFamily="34" charset="0"/>
+              <a:buChar char="•"/>
+            </a:pPr>
+            <a:r>
+              <a:rPr lang="en-US" dirty="0"/>
+              <a:t>Create/Update/Delete</a:t>
+            </a:r>
+          </a:p>
+          <a:p>
+            <a:pPr marL="342900" indent="-342900">
+              <a:buFont typeface="Arial" panose="020B0604020202020204" pitchFamily="34" charset="0"/>
+              <a:buChar char="•"/>
+            </a:pPr>
+            <a:r>
+              <a:rPr lang="en-US" dirty="0"/>
+              <a:t>Get by Id</a:t>
+            </a:r>
+          </a:p>
+          <a:p>
+            <a:pPr marL="342900" indent="-342900">
+              <a:buFont typeface="Arial" panose="020B0604020202020204" pitchFamily="34" charset="0"/>
+              <a:buChar char="•"/>
+            </a:pPr>
+            <a:r>
+              <a:rPr lang="en-US" dirty="0"/>
+              <a:t>Get all for user</a:t>
+            </a:r>
+          </a:p>
+          <a:p>
+            <a:pPr marL="342900" indent="-342900">
+              <a:buFont typeface="Arial" panose="020B0604020202020204" pitchFamily="34" charset="0"/>
+              <a:buChar char="•"/>
+            </a:pPr>
+            <a:endParaRPr lang="en-US" dirty="0"/>
+          </a:p>
+          <a:p>
+            <a:pPr marL="285750" indent="-285750">
+              <a:buFont typeface="Arial" panose="020B0604020202020204" pitchFamily="34" charset="0"/>
+              <a:buChar char="•"/>
+            </a:pPr>
+            <a:endParaRPr lang="en-GB" dirty="0"/>
+          </a:p>
+        </p:txBody>
+      </p:sp>
+      <p:sp>
+        <p:nvSpPr>
+          <p:cNvPr id="15" name="TextBox 14">
+            <a:extLst>
+              <a:ext uri="{FF2B5EF4-FFF2-40B4-BE49-F238E27FC236}">
+                <a16:creationId xmlns:a16="http://schemas.microsoft.com/office/drawing/2014/main" id="{4BDF2F06-66B9-CD63-E5BB-B1CFA854C2C6}"/>
+              </a:ext>
+            </a:extLst>
+          </p:cNvPr>
+          <p:cNvSpPr txBox="1"/>
+          <p:nvPr/>
+        </p:nvSpPr>
+        <p:spPr>
+          <a:xfrm>
+            <a:off x="8748919" y="1176124"/>
+            <a:ext cx="2677531" cy="2092881"/>
+          </a:xfrm>
+          <a:prstGeom prst="rect">
+            <a:avLst/>
+          </a:prstGeom>
+          <a:noFill/>
+        </p:spPr>
+        <p:txBody>
+          <a:bodyPr wrap="square" rtlCol="0">
+            <a:spAutoFit/>
+          </a:bodyPr>
+          <a:lstStyle/>
+          <a:p>
+            <a:r>
+              <a:rPr lang="en-US" sz="2000" dirty="0"/>
+              <a:t>Categories</a:t>
+            </a:r>
+          </a:p>
+          <a:p>
+            <a:pPr marL="342900" indent="-342900">
+              <a:buFont typeface="Arial" panose="020B0604020202020204" pitchFamily="34" charset="0"/>
+              <a:buChar char="•"/>
+            </a:pPr>
+            <a:r>
+              <a:rPr lang="en-US" sz="2000" dirty="0"/>
+              <a:t>Create/Update/Delete</a:t>
+            </a:r>
+          </a:p>
+          <a:p>
+            <a:pPr marL="342900" indent="-342900">
+              <a:buFont typeface="Arial" panose="020B0604020202020204" pitchFamily="34" charset="0"/>
+              <a:buChar char="•"/>
+            </a:pPr>
+            <a:r>
+              <a:rPr lang="en-US" dirty="0"/>
+              <a:t>Get All/By Id/By name</a:t>
+            </a:r>
+          </a:p>
+          <a:p>
+            <a:pPr marL="342900" indent="-342900">
+              <a:buFont typeface="Arial" panose="020B0604020202020204" pitchFamily="34" charset="0"/>
+              <a:buChar char="•"/>
+            </a:pPr>
+            <a:r>
+              <a:rPr lang="en-US" dirty="0"/>
+              <a:t>Download Image</a:t>
+            </a:r>
+          </a:p>
+          <a:p>
+            <a:pPr marL="342900" indent="-342900">
+              <a:buFont typeface="Arial" panose="020B0604020202020204" pitchFamily="34" charset="0"/>
+              <a:buChar char="•"/>
+            </a:pPr>
+            <a:endParaRPr lang="en-US" dirty="0"/>
+          </a:p>
+          <a:p>
+            <a:pPr marL="342900" indent="-342900">
+              <a:buFont typeface="Arial" panose="020B0604020202020204" pitchFamily="34" charset="0"/>
+              <a:buChar char="•"/>
+            </a:pPr>
+            <a:endParaRPr lang="en-US" dirty="0"/>
+          </a:p>
+          <a:p>
+            <a:pPr marL="285750" indent="-285750">
+              <a:buFont typeface="Arial" panose="020B0604020202020204" pitchFamily="34" charset="0"/>
+              <a:buChar char="•"/>
+            </a:pPr>
+            <a:endParaRPr lang="en-GB" dirty="0"/>
+          </a:p>
+        </p:txBody>
+      </p:sp>
+      <p:sp>
+        <p:nvSpPr>
+          <p:cNvPr id="18" name="TextBox 17">
+            <a:extLst>
+              <a:ext uri="{FF2B5EF4-FFF2-40B4-BE49-F238E27FC236}">
+                <a16:creationId xmlns:a16="http://schemas.microsoft.com/office/drawing/2014/main" id="{B59BB87F-8424-5014-D895-D85C1C2AABE2}"/>
+              </a:ext>
+            </a:extLst>
+          </p:cNvPr>
+          <p:cNvSpPr txBox="1"/>
+          <p:nvPr/>
+        </p:nvSpPr>
+        <p:spPr>
+          <a:xfrm>
+            <a:off x="686927" y="3099773"/>
+            <a:ext cx="2677531" cy="2431435"/>
+          </a:xfrm>
+          <a:prstGeom prst="rect">
+            <a:avLst/>
+          </a:prstGeom>
+          <a:noFill/>
+        </p:spPr>
+        <p:txBody>
+          <a:bodyPr wrap="square" rtlCol="0">
+            <a:spAutoFit/>
+          </a:bodyPr>
+          <a:lstStyle/>
+          <a:p>
+            <a:r>
+              <a:rPr lang="en-US" sz="2000" dirty="0"/>
+              <a:t>Scheduled Payments</a:t>
+            </a:r>
+          </a:p>
+          <a:p>
+            <a:pPr marL="342900" indent="-342900">
+              <a:buFont typeface="Arial" panose="020B0604020202020204" pitchFamily="34" charset="0"/>
+              <a:buChar char="•"/>
+            </a:pPr>
+            <a:r>
+              <a:rPr lang="en-US" sz="2000" dirty="0"/>
+              <a:t>Create/Update/Delete</a:t>
+            </a:r>
+          </a:p>
+          <a:p>
+            <a:pPr marL="342900" indent="-342900">
+              <a:buFont typeface="Arial" panose="020B0604020202020204" pitchFamily="34" charset="0"/>
+              <a:buChar char="•"/>
+            </a:pPr>
+            <a:r>
+              <a:rPr lang="en-US" sz="2000" dirty="0"/>
+              <a:t>Get By Id</a:t>
+            </a:r>
+          </a:p>
+          <a:p>
+            <a:pPr marL="342900" indent="-342900">
+              <a:buFont typeface="Arial" panose="020B0604020202020204" pitchFamily="34" charset="0"/>
+              <a:buChar char="•"/>
+            </a:pPr>
+            <a:r>
+              <a:rPr lang="en-US" sz="2000" dirty="0"/>
+              <a:t>Get All</a:t>
+            </a:r>
+          </a:p>
+          <a:p>
+            <a:pPr marL="342900" indent="-342900">
+              <a:buFont typeface="Arial" panose="020B0604020202020204" pitchFamily="34" charset="0"/>
+              <a:buChar char="•"/>
+            </a:pPr>
+            <a:endParaRPr lang="en-US" dirty="0"/>
+          </a:p>
+          <a:p>
+            <a:pPr marL="342900" indent="-342900">
+              <a:buFont typeface="Arial" panose="020B0604020202020204" pitchFamily="34" charset="0"/>
+              <a:buChar char="•"/>
+            </a:pPr>
+            <a:endParaRPr lang="en-US" dirty="0"/>
+          </a:p>
+          <a:p>
+            <a:pPr marL="342900" indent="-342900">
+              <a:buFont typeface="Arial" panose="020B0604020202020204" pitchFamily="34" charset="0"/>
+              <a:buChar char="•"/>
+            </a:pPr>
+            <a:endParaRPr lang="en-US" dirty="0"/>
+          </a:p>
+          <a:p>
+            <a:pPr marL="285750" indent="-285750">
+              <a:buFont typeface="Arial" panose="020B0604020202020204" pitchFamily="34" charset="0"/>
+              <a:buChar char="•"/>
+            </a:pPr>
+            <a:endParaRPr lang="en-GB" dirty="0"/>
+          </a:p>
+        </p:txBody>
+      </p:sp>
+      <p:sp>
+        <p:nvSpPr>
+          <p:cNvPr id="21" name="TextBox 20">
+            <a:extLst>
+              <a:ext uri="{FF2B5EF4-FFF2-40B4-BE49-F238E27FC236}">
+                <a16:creationId xmlns:a16="http://schemas.microsoft.com/office/drawing/2014/main" id="{9899B44A-1EBE-E8E6-B85F-8C8F0DC8C352}"/>
+              </a:ext>
+            </a:extLst>
+          </p:cNvPr>
+          <p:cNvSpPr txBox="1"/>
+          <p:nvPr/>
+        </p:nvSpPr>
+        <p:spPr>
+          <a:xfrm>
+            <a:off x="3271702" y="2957659"/>
+            <a:ext cx="2677531" cy="3046988"/>
+          </a:xfrm>
+          <a:prstGeom prst="rect">
+            <a:avLst/>
+          </a:prstGeom>
+          <a:noFill/>
+        </p:spPr>
+        <p:txBody>
+          <a:bodyPr wrap="square" rtlCol="0">
+            <a:spAutoFit/>
+          </a:bodyPr>
+          <a:lstStyle/>
+          <a:p>
+            <a:r>
+              <a:rPr lang="en-US" sz="2000" dirty="0"/>
+              <a:t>Transactions</a:t>
+            </a:r>
+          </a:p>
+          <a:p>
+            <a:pPr marL="342900" indent="-342900">
+              <a:buFont typeface="Arial" panose="020B0604020202020204" pitchFamily="34" charset="0"/>
+              <a:buChar char="•"/>
+            </a:pPr>
+            <a:r>
+              <a:rPr lang="en-US" sz="2000" dirty="0"/>
+              <a:t>Create</a:t>
+            </a:r>
+          </a:p>
+          <a:p>
+            <a:pPr marL="342900" indent="-342900">
+              <a:buFont typeface="Arial" panose="020B0604020202020204" pitchFamily="34" charset="0"/>
+              <a:buChar char="•"/>
+            </a:pPr>
+            <a:r>
+              <a:rPr lang="en-US" sz="2000" dirty="0"/>
+              <a:t>Get All/By Id</a:t>
+            </a:r>
+          </a:p>
+          <a:p>
+            <a:pPr marL="342900" indent="-342900">
+              <a:buFont typeface="Arial" panose="020B0604020202020204" pitchFamily="34" charset="0"/>
+              <a:buChar char="•"/>
+            </a:pPr>
+            <a:r>
+              <a:rPr lang="en-US" sz="2000" dirty="0"/>
+              <a:t>Get All filtered</a:t>
+            </a:r>
+          </a:p>
+          <a:p>
+            <a:pPr marL="342900" indent="-342900">
+              <a:buFont typeface="Arial" panose="020B0604020202020204" pitchFamily="34" charset="0"/>
+              <a:buChar char="•"/>
+            </a:pPr>
+            <a:r>
+              <a:rPr lang="en-US" sz="2000" dirty="0"/>
+              <a:t>Download reference</a:t>
+            </a:r>
+          </a:p>
+          <a:p>
+            <a:endParaRPr lang="en-US" sz="2000" dirty="0"/>
+          </a:p>
+          <a:p>
+            <a:pPr marL="342900" indent="-342900">
+              <a:buFont typeface="Arial" panose="020B0604020202020204" pitchFamily="34" charset="0"/>
+              <a:buChar char="•"/>
+            </a:pPr>
+            <a:endParaRPr lang="en-US" dirty="0"/>
+          </a:p>
+          <a:p>
+            <a:pPr marL="342900" indent="-342900">
+              <a:buFont typeface="Arial" panose="020B0604020202020204" pitchFamily="34" charset="0"/>
+              <a:buChar char="•"/>
+            </a:pPr>
+            <a:endParaRPr lang="en-US" dirty="0"/>
+          </a:p>
+          <a:p>
+            <a:pPr marL="342900" indent="-342900">
+              <a:buFont typeface="Arial" panose="020B0604020202020204" pitchFamily="34" charset="0"/>
+              <a:buChar char="•"/>
+            </a:pPr>
+            <a:endParaRPr lang="en-US" dirty="0"/>
+          </a:p>
+          <a:p>
+            <a:pPr marL="285750" indent="-285750">
+              <a:buFont typeface="Arial" panose="020B0604020202020204" pitchFamily="34" charset="0"/>
+              <a:buChar char="•"/>
+            </a:pPr>
+            <a:endParaRPr lang="en-GB" dirty="0"/>
+          </a:p>
+        </p:txBody>
+      </p:sp>
+      <p:sp>
+        <p:nvSpPr>
+          <p:cNvPr id="24" name="TextBox 23">
+            <a:extLst>
+              <a:ext uri="{FF2B5EF4-FFF2-40B4-BE49-F238E27FC236}">
+                <a16:creationId xmlns:a16="http://schemas.microsoft.com/office/drawing/2014/main" id="{76F6C45F-DDE6-6BE7-F16F-F6F69D26B166}"/>
+              </a:ext>
+            </a:extLst>
+          </p:cNvPr>
+          <p:cNvSpPr txBox="1"/>
+          <p:nvPr/>
+        </p:nvSpPr>
+        <p:spPr>
+          <a:xfrm>
+            <a:off x="5944217" y="2952029"/>
+            <a:ext cx="2677531" cy="3354765"/>
+          </a:xfrm>
+          <a:prstGeom prst="rect">
+            <a:avLst/>
+          </a:prstGeom>
+          <a:noFill/>
+        </p:spPr>
+        <p:txBody>
+          <a:bodyPr wrap="square" rtlCol="0">
+            <a:spAutoFit/>
+          </a:bodyPr>
+          <a:lstStyle/>
+          <a:p>
+            <a:r>
+              <a:rPr lang="en-US" sz="2000" dirty="0"/>
+              <a:t>Transfers</a:t>
+            </a:r>
+          </a:p>
+          <a:p>
+            <a:pPr marL="342900" indent="-342900">
+              <a:buFont typeface="Arial" panose="020B0604020202020204" pitchFamily="34" charset="0"/>
+              <a:buChar char="•"/>
+            </a:pPr>
+            <a:r>
+              <a:rPr lang="en-US" sz="2000" dirty="0"/>
+              <a:t>Create</a:t>
+            </a:r>
+          </a:p>
+          <a:p>
+            <a:pPr marL="342900" indent="-342900">
+              <a:buFont typeface="Arial" panose="020B0604020202020204" pitchFamily="34" charset="0"/>
+              <a:buChar char="•"/>
+            </a:pPr>
+            <a:r>
+              <a:rPr lang="en-US" sz="2000" dirty="0"/>
+              <a:t>Get All sent/received</a:t>
+            </a:r>
+          </a:p>
+          <a:p>
+            <a:pPr marL="342900" indent="-342900">
+              <a:buFont typeface="Arial" panose="020B0604020202020204" pitchFamily="34" charset="0"/>
+              <a:buChar char="•"/>
+            </a:pPr>
+            <a:r>
+              <a:rPr lang="en-US" sz="2000" dirty="0"/>
+              <a:t>Get By Id</a:t>
+            </a:r>
+          </a:p>
+          <a:p>
+            <a:pPr marL="342900" indent="-342900">
+              <a:buFont typeface="Arial" panose="020B0604020202020204" pitchFamily="34" charset="0"/>
+              <a:buChar char="•"/>
+            </a:pPr>
+            <a:r>
+              <a:rPr lang="en-US" sz="2000" dirty="0"/>
+              <a:t>Get All Filtered</a:t>
+            </a:r>
+          </a:p>
+          <a:p>
+            <a:pPr marL="342900" indent="-342900">
+              <a:buFont typeface="Arial" panose="020B0604020202020204" pitchFamily="34" charset="0"/>
+              <a:buChar char="•"/>
+            </a:pPr>
+            <a:r>
+              <a:rPr lang="en-US" sz="2000" dirty="0"/>
+              <a:t>Download reference</a:t>
+            </a:r>
+          </a:p>
+          <a:p>
+            <a:endParaRPr lang="en-US" sz="2000" dirty="0"/>
+          </a:p>
+          <a:p>
+            <a:pPr marL="342900" indent="-342900">
+              <a:buFont typeface="Arial" panose="020B0604020202020204" pitchFamily="34" charset="0"/>
+              <a:buChar char="•"/>
+            </a:pPr>
+            <a:endParaRPr lang="en-US" dirty="0"/>
+          </a:p>
+          <a:p>
+            <a:pPr marL="342900" indent="-342900">
+              <a:buFont typeface="Arial" panose="020B0604020202020204" pitchFamily="34" charset="0"/>
+              <a:buChar char="•"/>
+            </a:pPr>
+            <a:endParaRPr lang="en-US" dirty="0"/>
+          </a:p>
+          <a:p>
+            <a:pPr marL="342900" indent="-342900">
+              <a:buFont typeface="Arial" panose="020B0604020202020204" pitchFamily="34" charset="0"/>
+              <a:buChar char="•"/>
+            </a:pPr>
+            <a:endParaRPr lang="en-US" dirty="0"/>
+          </a:p>
+          <a:p>
+            <a:pPr marL="285750" indent="-285750">
+              <a:buFont typeface="Arial" panose="020B0604020202020204" pitchFamily="34" charset="0"/>
+              <a:buChar char="•"/>
+            </a:pPr>
+            <a:endParaRPr lang="en-GB" dirty="0"/>
+          </a:p>
+        </p:txBody>
+      </p:sp>
+    </p:spTree>
+    <p:extLst>
+      <p:ext uri="{BB962C8B-B14F-4D97-AF65-F5344CB8AC3E}">
+        <p14:creationId xmlns:p14="http://schemas.microsoft.com/office/powerpoint/2010/main" val="855215445"/>
+      </p:ext>
+    </p:extLst>
+  </p:cSld>
+  <p:clrMapOvr>
+    <a:masterClrMapping/>
+  </p:clrMapOvr>
+</p:sld>
+</file>
+
+<file path=ppt/slides/slide7.xml><?xml version="1.0" encoding="utf-8"?>
+<p:sld xmlns:a="http://schemas.openxmlformats.org/drawingml/2006/main" xmlns:r="http://schemas.openxmlformats.org/officeDocument/2006/relationships" xmlns:p="http://schemas.openxmlformats.org/presentationml/2006/main">
+  <p:cSld>
+    <p:spTree>
+      <p:nvGrpSpPr>
+        <p:cNvPr id="1" name=""/>
+        <p:cNvGrpSpPr/>
+        <p:nvPr/>
+      </p:nvGrpSpPr>
+      <p:grpSpPr>
+        <a:xfrm>
+          <a:off x="0" y="0"/>
+          <a:ext cx="0" cy="0"/>
+          <a:chOff x="0" y="0"/>
+          <a:chExt cx="0" cy="0"/>
+        </a:xfrm>
+      </p:grpSpPr>
+      <p:sp>
+        <p:nvSpPr>
+          <p:cNvPr id="7" name="TextBox 6">
+            <a:extLst>
+              <a:ext uri="{FF2B5EF4-FFF2-40B4-BE49-F238E27FC236}">
+                <a16:creationId xmlns:a16="http://schemas.microsoft.com/office/drawing/2014/main" id="{8FCE0A66-174D-DA21-8C2E-806D62E1848B}"/>
+              </a:ext>
+            </a:extLst>
+          </p:cNvPr>
+          <p:cNvSpPr txBox="1"/>
+          <p:nvPr/>
+        </p:nvSpPr>
+        <p:spPr>
+          <a:xfrm>
+            <a:off x="2498436" y="1348509"/>
+            <a:ext cx="7195128" cy="1107996"/>
+          </a:xfrm>
+          <a:prstGeom prst="rect">
+            <a:avLst/>
+          </a:prstGeom>
+          <a:noFill/>
+        </p:spPr>
+        <p:txBody>
+          <a:bodyPr wrap="square" rtlCol="0">
+            <a:spAutoFit/>
+          </a:bodyPr>
+          <a:lstStyle/>
+          <a:p>
+            <a:pPr algn="ctr"/>
+            <a:r>
+              <a:rPr lang="en-US" sz="6600" b="1" dirty="0"/>
+              <a:t>Demo Time?</a:t>
+            </a:r>
+            <a:endParaRPr lang="en-GB" sz="6600" b="1" dirty="0"/>
+          </a:p>
+        </p:txBody>
+      </p:sp>
+      <p:pic>
+        <p:nvPicPr>
+          <p:cNvPr id="9" name="Picture 8" descr="Icon&#10;&#10;Description automatically generated">
+            <a:extLst>
+              <a:ext uri="{FF2B5EF4-FFF2-40B4-BE49-F238E27FC236}">
+                <a16:creationId xmlns:a16="http://schemas.microsoft.com/office/drawing/2014/main" id="{C93E8B3F-1D21-B87F-DB6C-80D79496572A}"/>
+              </a:ext>
+            </a:extLst>
+          </p:cNvPr>
+          <p:cNvPicPr>
+            <a:picLocks noChangeAspect="1"/>
+          </p:cNvPicPr>
+          <p:nvPr/>
+        </p:nvPicPr>
+        <p:blipFill>
+          <a:blip r:embed="rId2"/>
+          <a:stretch>
+            <a:fillRect/>
+          </a:stretch>
+        </p:blipFill>
+        <p:spPr>
+          <a:xfrm>
+            <a:off x="4667250" y="2917328"/>
+            <a:ext cx="2857500" cy="2857500"/>
+          </a:xfrm>
+          <a:prstGeom prst="rect">
+            <a:avLst/>
+          </a:prstGeom>
+        </p:spPr>
+      </p:pic>
+    </p:spTree>
+    <p:extLst>
+      <p:ext uri="{BB962C8B-B14F-4D97-AF65-F5344CB8AC3E}">
+        <p14:creationId xmlns:p14="http://schemas.microsoft.com/office/powerpoint/2010/main" val="2950596197"/>
       </p:ext>
     </p:extLst>
   </p:cSld>
@@ -13641,15 +13939,6 @@
 </file>
 
 <file path=customXml/item1.xml><?xml version="1.0" encoding="utf-8"?>
-<?mso-contentType ?>
-<FormTemplates xmlns="http://schemas.microsoft.com/sharepoint/v3/contenttype/forms">
-  <Display>DocumentLibraryForm</Display>
-  <Edit>DocumentLibraryForm</Edit>
-  <New>DocumentLibraryForm</New>
-</FormTemplates>
-</file>
-
-<file path=customXml/item2.xml><?xml version="1.0" encoding="utf-8"?>
 <ct:contentTypeSchema xmlns:ct="http://schemas.microsoft.com/office/2006/metadata/contentType" xmlns:ma="http://schemas.microsoft.com/office/2006/metadata/properties/metaAttributes" ct:_="" ma:_="" ma:contentTypeName="Document" ma:contentTypeID="0x01010079F111ED35F8CC479449609E8A0923A6" ma:contentTypeVersion="25" ma:contentTypeDescription="Create a new document." ma:contentTypeScope="" ma:versionID="e02306daf00165b375dc6a58966960be">
   <xsd:schema xmlns:xsd="http://www.w3.org/2001/XMLSchema" xmlns:xs="http://www.w3.org/2001/XMLSchema" xmlns:p="http://schemas.microsoft.com/office/2006/metadata/properties" xmlns:ns1="http://schemas.microsoft.com/sharepoint/v3" xmlns:ns2="71af3243-3dd4-4a8d-8c0d-dd76da1f02a5" xmlns:ns3="16c05727-aa75-4e4a-9b5f-8a80a1165891" xmlns:ns4="230e9df3-be65-4c73-a93b-d1236ebd677e" targetNamespace="http://schemas.microsoft.com/office/2006/metadata/properties" ma:root="true" ma:fieldsID="df88fb76bf5f555224557953949c1ec9" ns1:_="" ns2:_="" ns3:_="" ns4:_="">
     <xsd:import namespace="http://schemas.microsoft.com/sharepoint/v3"/>
@@ -13943,6 +14232,15 @@
 </ct:contentTypeSchema>
 </file>
 
+<file path=customXml/item2.xml><?xml version="1.0" encoding="utf-8"?>
+<?mso-contentType ?>
+<FormTemplates xmlns="http://schemas.microsoft.com/sharepoint/v3/contenttype/forms">
+  <Display>DocumentLibraryForm</Display>
+  <Edit>DocumentLibraryForm</Edit>
+  <New>DocumentLibraryForm</New>
+</FormTemplates>
+</file>
+
 <file path=customXml/item3.xml><?xml version="1.0" encoding="utf-8"?>
 <p:properties xmlns:p="http://schemas.microsoft.com/office/2006/metadata/properties" xmlns:xsi="http://www.w3.org/2001/XMLSchema-instance" xmlns:pc="http://schemas.microsoft.com/office/infopath/2007/PartnerControls">
   <documentManagement>
@@ -13964,14 +14262,6 @@
 </file>
 
 <file path=customXml/itemProps1.xml><?xml version="1.0" encoding="utf-8"?>
-<ds:datastoreItem xmlns:ds="http://schemas.openxmlformats.org/officeDocument/2006/customXml" ds:itemID="{0E8B3377-22F1-4153-96F0-CC2E4BE41C57}">
-  <ds:schemaRefs>
-    <ds:schemaRef ds:uri="http://schemas.microsoft.com/sharepoint/v3/contenttype/forms"/>
-  </ds:schemaRefs>
-</ds:datastoreItem>
-</file>
-
-<file path=customXml/itemProps2.xml><?xml version="1.0" encoding="utf-8"?>
 <ds:datastoreItem xmlns:ds="http://schemas.openxmlformats.org/officeDocument/2006/customXml" ds:itemID="{2EB2FABB-45EC-440E-B647-8CA57BA45ACA}">
   <ds:schemaRefs>
     <ds:schemaRef ds:uri="http://schemas.microsoft.com/office/2006/metadata/contentType"/>
@@ -13992,6 +14282,14 @@
 </ds:datastoreItem>
 </file>
 
+<file path=customXml/itemProps2.xml><?xml version="1.0" encoding="utf-8"?>
+<ds:datastoreItem xmlns:ds="http://schemas.openxmlformats.org/officeDocument/2006/customXml" ds:itemID="{0E8B3377-22F1-4153-96F0-CC2E4BE41C57}">
+  <ds:schemaRefs>
+    <ds:schemaRef ds:uri="http://schemas.microsoft.com/sharepoint/v3/contenttype/forms"/>
+  </ds:schemaRefs>
+</ds:datastoreItem>
+</file>
+
 <file path=customXml/itemProps3.xml><?xml version="1.0" encoding="utf-8"?>
 <ds:datastoreItem xmlns:ds="http://schemas.openxmlformats.org/officeDocument/2006/customXml" ds:itemID="{99746342-5E84-430E-9251-61001F208E7A}">
   <ds:schemaRefs>

</xml_diff>